<commit_message>
finished layout 2 code added dynamics to logo placement fct adjusted dispatcher
</commit_message>
<xml_diff>
--- a/templates.pptx
+++ b/templates.pptx
@@ -9220,7 +9220,7 @@
           <p:nvPr>
             <p:extLst>
               <p:ext uri="{D42A27DB-BD31-4B8C-83A1-F6EECF244321}">
-                <p14:modId xmlns:p14="http://schemas.microsoft.com/office/powerpoint/2010/main" val="2843624540"/>
+                <p14:modId xmlns:p14="http://schemas.microsoft.com/office/powerpoint/2010/main" val="3128434163"/>
               </p:ext>
             </p:extLst>
           </p:nvPr>
@@ -9248,14 +9248,14 @@
                     </a:ext>
                   </a:extLst>
                 </a:gridCol>
-                <a:gridCol w="829079">
+                <a:gridCol w="1041296">
                   <a:extLst>
                     <a:ext uri="{9D8B030D-6E8A-4147-A177-3AD203B41FA5}">
                       <a16:colId xmlns:a16="http://schemas.microsoft.com/office/drawing/2014/main" val="3721709830"/>
                     </a:ext>
                   </a:extLst>
                 </a:gridCol>
-                <a:gridCol w="4714875">
+                <a:gridCol w="4502658">
                   <a:extLst>
                     <a:ext uri="{9D8B030D-6E8A-4147-A177-3AD203B41FA5}">
                       <a16:colId xmlns:a16="http://schemas.microsoft.com/office/drawing/2014/main" val="20001"/>
@@ -9463,6 +9463,53 @@
                         <a:defRPr/>
                       </a:pPr>
                       <a:r>
+                        <a:rPr kumimoji="0" lang="en-GB" sz="700" b="1" i="0" u="none" strike="noStrike" cap="none" normalizeH="0" baseline="0" noProof="0">
+                          <a:ln>
+                            <a:noFill/>
+                          </a:ln>
+                          <a:solidFill>
+                            <a:srgbClr val="FFFFFF"/>
+                          </a:solidFill>
+                          <a:effectLst/>
+                          <a:latin typeface="Arial" panose="020B0604020202020204" pitchFamily="34" charset="0"/>
+                        </a:rPr>
+                        <a:t>Financials </a:t>
+                      </a:r>
+                    </a:p>
+                    <a:p>
+                      <a:pPr marL="0" marR="0" lvl="0" indent="0" algn="ctr" defTabSz="958850" rtl="0" eaLnBrk="1" fontAlgn="base" latinLnBrk="0" hangingPunct="1">
+                        <a:lnSpc>
+                          <a:spcPct val="100000"/>
+                        </a:lnSpc>
+                        <a:spcBef>
+                          <a:spcPct val="0"/>
+                        </a:spcBef>
+                        <a:spcAft>
+                          <a:spcPts val="0"/>
+                        </a:spcAft>
+                        <a:buClr>
+                          <a:srgbClr val="000080"/>
+                        </a:buClr>
+                        <a:buSzTx/>
+                        <a:buFont typeface="Wingdings" pitchFamily="2" charset="2"/>
+                        <a:buNone/>
+                        <a:tabLst/>
+                        <a:defRPr/>
+                      </a:pPr>
+                      <a:r>
+                        <a:rPr kumimoji="0" lang="en-GB" sz="700" b="1" i="0" u="none" strike="noStrike" cap="none" normalizeH="0" baseline="0" noProof="0">
+                          <a:ln>
+                            <a:noFill/>
+                          </a:ln>
+                          <a:solidFill>
+                            <a:srgbClr val="FFFFFF"/>
+                          </a:solidFill>
+                          <a:effectLst/>
+                          <a:latin typeface="Arial" panose="020B0604020202020204" pitchFamily="34" charset="0"/>
+                        </a:rPr>
+                        <a:t>(</a:t>
+                      </a:r>
+                      <a:r>
                         <a:rPr kumimoji="0" lang="en-GB" sz="700" b="1" i="0" u="none" strike="noStrike" cap="none" normalizeH="0" baseline="0" noProof="0" dirty="0">
                           <a:ln>
                             <a:noFill/>
@@ -9473,7 +9520,7 @@
                           <a:effectLst/>
                           <a:latin typeface="Arial" panose="020B0604020202020204" pitchFamily="34" charset="0"/>
                         </a:rPr>
-                        <a:t>Financials (USD MM)</a:t>
+                        <a:t>USD MM)</a:t>
                       </a:r>
                     </a:p>
                   </a:txBody>
@@ -10187,7 +10234,121 @@
                           <a:ea typeface="+mn-ea"/>
                           <a:cs typeface="+mn-cs"/>
                         </a:rPr>
-                        <a:t>Revenue: EBITDA:  Market Cap: Total Debt:</a:t>
+                        <a:t>Revenue:</a:t>
+                      </a:r>
+                    </a:p>
+                    <a:p>
+                      <a:pPr marL="0" marR="0" lvl="0" indent="0" algn="l" defTabSz="914395" rtl="0" eaLnBrk="1" fontAlgn="t" latinLnBrk="0" hangingPunct="1">
+                        <a:lnSpc>
+                          <a:spcPct val="100000"/>
+                        </a:lnSpc>
+                        <a:spcBef>
+                          <a:spcPts val="0"/>
+                        </a:spcBef>
+                        <a:spcAft>
+                          <a:spcPts val="0"/>
+                        </a:spcAft>
+                        <a:buClr>
+                          <a:srgbClr val="003B4C"/>
+                        </a:buClr>
+                        <a:buSzTx/>
+                        <a:buFont typeface="Wingdings" panose="05000000000000000000" pitchFamily="2" charset="2"/>
+                        <a:buNone/>
+                        <a:tabLst/>
+                        <a:defRPr/>
+                      </a:pPr>
+                      <a:r>
+                        <a:rPr kumimoji="0" lang="en-GB" sz="700" b="0" i="0" u="none" strike="noStrike" kern="1200" cap="none" spc="0" normalizeH="0" baseline="0" noProof="0" dirty="0">
+                          <a:ln>
+                            <a:noFill/>
+                          </a:ln>
+                          <a:solidFill>
+                            <a:srgbClr val="003B4C"/>
+                          </a:solidFill>
+                          <a:effectLst/>
+                          <a:uLnTx/>
+                          <a:uFillTx/>
+                          <a:latin typeface="Arial" panose="020B0604020202020204" pitchFamily="34" charset="0"/>
+                          <a:ea typeface="+mn-ea"/>
+                          <a:cs typeface="+mn-cs"/>
+                        </a:rPr>
+                        <a:t>EBITDA:</a:t>
+                      </a:r>
+                    </a:p>
+                    <a:p>
+                      <a:pPr marL="0" marR="0" lvl="0" indent="0" algn="l" defTabSz="914395" rtl="0" eaLnBrk="1" fontAlgn="t" latinLnBrk="0" hangingPunct="1">
+                        <a:lnSpc>
+                          <a:spcPct val="100000"/>
+                        </a:lnSpc>
+                        <a:spcBef>
+                          <a:spcPts val="0"/>
+                        </a:spcBef>
+                        <a:spcAft>
+                          <a:spcPts val="0"/>
+                        </a:spcAft>
+                        <a:buClr>
+                          <a:srgbClr val="003B4C"/>
+                        </a:buClr>
+                        <a:buSzTx/>
+                        <a:buFont typeface="Wingdings" panose="05000000000000000000" pitchFamily="2" charset="2"/>
+                        <a:buNone/>
+                        <a:tabLst/>
+                        <a:defRPr/>
+                      </a:pPr>
+                      <a:r>
+                        <a:rPr kumimoji="0" lang="en-GB" sz="700" b="0" i="0" u="none" strike="noStrike" kern="1200" cap="none" spc="0" normalizeH="0" baseline="0" noProof="0" dirty="0">
+                          <a:ln>
+                            <a:noFill/>
+                          </a:ln>
+                          <a:solidFill>
+                            <a:srgbClr val="003B4C"/>
+                          </a:solidFill>
+                          <a:effectLst/>
+                          <a:uLnTx/>
+                          <a:uFillTx/>
+                          <a:latin typeface="Arial" panose="020B0604020202020204" pitchFamily="34" charset="0"/>
+                          <a:ea typeface="+mn-ea"/>
+                          <a:cs typeface="+mn-cs"/>
+                        </a:rPr>
+                        <a:t>Market Cap:</a:t>
+                      </a:r>
+                    </a:p>
+                    <a:p>
+                      <a:pPr marL="0" marR="0" lvl="0" indent="0" algn="l" defTabSz="914395" rtl="0" eaLnBrk="1" fontAlgn="t" latinLnBrk="0" hangingPunct="1">
+                        <a:lnSpc>
+                          <a:spcPct val="100000"/>
+                        </a:lnSpc>
+                        <a:spcBef>
+                          <a:spcPts val="0"/>
+                        </a:spcBef>
+                        <a:spcAft>
+                          <a:spcPts val="0"/>
+                        </a:spcAft>
+                        <a:buClr>
+                          <a:srgbClr val="003B4C"/>
+                        </a:buClr>
+                        <a:buSzTx/>
+                        <a:buFont typeface="Wingdings" panose="05000000000000000000" pitchFamily="2" charset="2"/>
+                        <a:buNone/>
+                        <a:tabLst/>
+                        <a:defRPr/>
+                      </a:pPr>
+                      <a:r>
+                        <a:rPr kumimoji="0" lang="en-GB" sz="700" b="0" i="0" u="none" strike="noStrike" kern="1200" cap="none" spc="0" normalizeH="0" baseline="0" noProof="0" dirty="0">
+                          <a:ln>
+                            <a:noFill/>
+                          </a:ln>
+                          <a:solidFill>
+                            <a:srgbClr val="003B4C"/>
+                          </a:solidFill>
+                          <a:effectLst/>
+                          <a:uLnTx/>
+                          <a:uFillTx/>
+                          <a:latin typeface="Arial" panose="020B0604020202020204" pitchFamily="34" charset="0"/>
+                          <a:ea typeface="+mn-ea"/>
+                          <a:cs typeface="+mn-cs"/>
+                        </a:rPr>
+                        <a:t>Total Debt:</a:t>
                       </a:r>
                     </a:p>
                     <a:p>
@@ -11004,7 +11165,159 @@
                           <a:ea typeface="+mn-ea"/>
                           <a:cs typeface="+mn-cs"/>
                         </a:rPr>
-                        <a:t>Revenue: EBITDA:  Market Cap: Total Debt:</a:t>
+                        <a:t>Revenue:</a:t>
+                      </a:r>
+                    </a:p>
+                    <a:p>
+                      <a:pPr marL="0" marR="0" lvl="0" indent="0" algn="l" defTabSz="914395" rtl="0" eaLnBrk="1" fontAlgn="t" latinLnBrk="0" hangingPunct="1">
+                        <a:lnSpc>
+                          <a:spcPct val="100000"/>
+                        </a:lnSpc>
+                        <a:spcBef>
+                          <a:spcPts val="0"/>
+                        </a:spcBef>
+                        <a:spcAft>
+                          <a:spcPts val="0"/>
+                        </a:spcAft>
+                        <a:buClr>
+                          <a:srgbClr val="003B4C"/>
+                        </a:buClr>
+                        <a:buSzTx/>
+                        <a:buFont typeface="Wingdings" panose="05000000000000000000" pitchFamily="2" charset="2"/>
+                        <a:buNone/>
+                        <a:tabLst/>
+                        <a:defRPr/>
+                      </a:pPr>
+                      <a:r>
+                        <a:rPr kumimoji="0" lang="en-GB" sz="700" b="0" i="0" u="none" strike="noStrike" kern="1200" cap="none" spc="0" normalizeH="0" baseline="0" noProof="0" dirty="0">
+                          <a:ln>
+                            <a:noFill/>
+                          </a:ln>
+                          <a:solidFill>
+                            <a:srgbClr val="003B4C"/>
+                          </a:solidFill>
+                          <a:effectLst/>
+                          <a:uLnTx/>
+                          <a:uFillTx/>
+                          <a:latin typeface="Arial" panose="020B0604020202020204" pitchFamily="34" charset="0"/>
+                          <a:ea typeface="+mn-ea"/>
+                          <a:cs typeface="+mn-cs"/>
+                        </a:rPr>
+                        <a:t>EBITDA:</a:t>
+                      </a:r>
+                    </a:p>
+                    <a:p>
+                      <a:pPr marL="0" marR="0" lvl="0" indent="0" algn="l" defTabSz="914395" rtl="0" eaLnBrk="1" fontAlgn="t" latinLnBrk="0" hangingPunct="1">
+                        <a:lnSpc>
+                          <a:spcPct val="100000"/>
+                        </a:lnSpc>
+                        <a:spcBef>
+                          <a:spcPts val="0"/>
+                        </a:spcBef>
+                        <a:spcAft>
+                          <a:spcPts val="0"/>
+                        </a:spcAft>
+                        <a:buClr>
+                          <a:srgbClr val="003B4C"/>
+                        </a:buClr>
+                        <a:buSzTx/>
+                        <a:buFont typeface="Wingdings" panose="05000000000000000000" pitchFamily="2" charset="2"/>
+                        <a:buNone/>
+                        <a:tabLst/>
+                        <a:defRPr/>
+                      </a:pPr>
+                      <a:r>
+                        <a:rPr kumimoji="0" lang="en-GB" sz="700" b="0" i="0" u="none" strike="noStrike" kern="1200" cap="none" spc="0" normalizeH="0" baseline="0" noProof="0" dirty="0">
+                          <a:ln>
+                            <a:noFill/>
+                          </a:ln>
+                          <a:solidFill>
+                            <a:srgbClr val="003B4C"/>
+                          </a:solidFill>
+                          <a:effectLst/>
+                          <a:uLnTx/>
+                          <a:uFillTx/>
+                          <a:latin typeface="Arial" panose="020B0604020202020204" pitchFamily="34" charset="0"/>
+                          <a:ea typeface="+mn-ea"/>
+                          <a:cs typeface="+mn-cs"/>
+                        </a:rPr>
+                        <a:t>Market Cap:</a:t>
+                      </a:r>
+                    </a:p>
+                    <a:p>
+                      <a:pPr marL="0" marR="0" lvl="0" indent="0" algn="l" defTabSz="914395" rtl="0" eaLnBrk="1" fontAlgn="t" latinLnBrk="0" hangingPunct="1">
+                        <a:lnSpc>
+                          <a:spcPct val="100000"/>
+                        </a:lnSpc>
+                        <a:spcBef>
+                          <a:spcPts val="0"/>
+                        </a:spcBef>
+                        <a:spcAft>
+                          <a:spcPts val="0"/>
+                        </a:spcAft>
+                        <a:buClr>
+                          <a:srgbClr val="003B4C"/>
+                        </a:buClr>
+                        <a:buSzTx/>
+                        <a:buFont typeface="Wingdings" panose="05000000000000000000" pitchFamily="2" charset="2"/>
+                        <a:buNone/>
+                        <a:tabLst/>
+                        <a:defRPr/>
+                      </a:pPr>
+                      <a:r>
+                        <a:rPr kumimoji="0" lang="en-GB" sz="700" b="0" i="0" u="none" strike="noStrike" kern="1200" cap="none" spc="0" normalizeH="0" baseline="0" noProof="0" dirty="0">
+                          <a:ln>
+                            <a:noFill/>
+                          </a:ln>
+                          <a:solidFill>
+                            <a:srgbClr val="003B4C"/>
+                          </a:solidFill>
+                          <a:effectLst/>
+                          <a:uLnTx/>
+                          <a:uFillTx/>
+                          <a:latin typeface="Arial" panose="020B0604020202020204" pitchFamily="34" charset="0"/>
+                          <a:ea typeface="+mn-ea"/>
+                          <a:cs typeface="+mn-cs"/>
+                        </a:rPr>
+                        <a:t>Total Debt:</a:t>
+                      </a:r>
+                    </a:p>
+                    <a:p>
+                      <a:pPr marL="0" marR="0" lvl="0" indent="0" algn="l" defTabSz="914395" rtl="0" eaLnBrk="1" fontAlgn="t" latinLnBrk="0" hangingPunct="1">
+                        <a:lnSpc>
+                          <a:spcPct val="100000"/>
+                        </a:lnSpc>
+                        <a:spcBef>
+                          <a:spcPts val="0"/>
+                        </a:spcBef>
+                        <a:spcAft>
+                          <a:spcPts val="0"/>
+                        </a:spcAft>
+                        <a:buClr>
+                          <a:srgbClr val="003B4C"/>
+                        </a:buClr>
+                        <a:buSzTx/>
+                        <a:buFont typeface="Wingdings" panose="05000000000000000000" pitchFamily="2" charset="2"/>
+                        <a:buNone/>
+                        <a:tabLst/>
+                        <a:defRPr/>
+                      </a:pPr>
+                      <a:r>
+                        <a:rPr kumimoji="0" lang="en-GB" sz="700" b="0" i="0" u="none" strike="noStrike" kern="1200" cap="none" spc="0" normalizeH="0" baseline="0" noProof="0" dirty="0">
+                          <a:ln>
+                            <a:noFill/>
+                          </a:ln>
+                          <a:solidFill>
+                            <a:srgbClr val="003B4C"/>
+                          </a:solidFill>
+                          <a:effectLst/>
+                          <a:uLnTx/>
+                          <a:uFillTx/>
+                          <a:latin typeface="Arial" panose="020B0604020202020204" pitchFamily="34" charset="0"/>
+                          <a:ea typeface="+mn-ea"/>
+                          <a:cs typeface="+mn-cs"/>
+                        </a:rPr>
+                        <a:t>FTE:</a:t>
                       </a:r>
                     </a:p>
                   </a:txBody>
@@ -11791,7 +12104,159 @@
                           <a:ea typeface="+mn-ea"/>
                           <a:cs typeface="+mn-cs"/>
                         </a:rPr>
-                        <a:t>Revenue: EBITDA:  Market Cap: Total Debt:</a:t>
+                        <a:t>Revenue:</a:t>
+                      </a:r>
+                    </a:p>
+                    <a:p>
+                      <a:pPr marL="0" marR="0" lvl="0" indent="0" algn="l" defTabSz="914395" rtl="0" eaLnBrk="1" fontAlgn="t" latinLnBrk="0" hangingPunct="1">
+                        <a:lnSpc>
+                          <a:spcPct val="100000"/>
+                        </a:lnSpc>
+                        <a:spcBef>
+                          <a:spcPts val="0"/>
+                        </a:spcBef>
+                        <a:spcAft>
+                          <a:spcPts val="0"/>
+                        </a:spcAft>
+                        <a:buClr>
+                          <a:srgbClr val="003B4C"/>
+                        </a:buClr>
+                        <a:buSzTx/>
+                        <a:buFont typeface="Wingdings" panose="05000000000000000000" pitchFamily="2" charset="2"/>
+                        <a:buNone/>
+                        <a:tabLst/>
+                        <a:defRPr/>
+                      </a:pPr>
+                      <a:r>
+                        <a:rPr kumimoji="0" lang="en-GB" sz="700" b="0" i="0" u="none" strike="noStrike" kern="1200" cap="none" spc="0" normalizeH="0" baseline="0" noProof="0" dirty="0">
+                          <a:ln>
+                            <a:noFill/>
+                          </a:ln>
+                          <a:solidFill>
+                            <a:srgbClr val="003B4C"/>
+                          </a:solidFill>
+                          <a:effectLst/>
+                          <a:uLnTx/>
+                          <a:uFillTx/>
+                          <a:latin typeface="Arial" panose="020B0604020202020204" pitchFamily="34" charset="0"/>
+                          <a:ea typeface="+mn-ea"/>
+                          <a:cs typeface="+mn-cs"/>
+                        </a:rPr>
+                        <a:t>EBITDA:</a:t>
+                      </a:r>
+                    </a:p>
+                    <a:p>
+                      <a:pPr marL="0" marR="0" lvl="0" indent="0" algn="l" defTabSz="914395" rtl="0" eaLnBrk="1" fontAlgn="t" latinLnBrk="0" hangingPunct="1">
+                        <a:lnSpc>
+                          <a:spcPct val="100000"/>
+                        </a:lnSpc>
+                        <a:spcBef>
+                          <a:spcPts val="0"/>
+                        </a:spcBef>
+                        <a:spcAft>
+                          <a:spcPts val="0"/>
+                        </a:spcAft>
+                        <a:buClr>
+                          <a:srgbClr val="003B4C"/>
+                        </a:buClr>
+                        <a:buSzTx/>
+                        <a:buFont typeface="Wingdings" panose="05000000000000000000" pitchFamily="2" charset="2"/>
+                        <a:buNone/>
+                        <a:tabLst/>
+                        <a:defRPr/>
+                      </a:pPr>
+                      <a:r>
+                        <a:rPr kumimoji="0" lang="en-GB" sz="700" b="0" i="0" u="none" strike="noStrike" kern="1200" cap="none" spc="0" normalizeH="0" baseline="0" noProof="0" dirty="0">
+                          <a:ln>
+                            <a:noFill/>
+                          </a:ln>
+                          <a:solidFill>
+                            <a:srgbClr val="003B4C"/>
+                          </a:solidFill>
+                          <a:effectLst/>
+                          <a:uLnTx/>
+                          <a:uFillTx/>
+                          <a:latin typeface="Arial" panose="020B0604020202020204" pitchFamily="34" charset="0"/>
+                          <a:ea typeface="+mn-ea"/>
+                          <a:cs typeface="+mn-cs"/>
+                        </a:rPr>
+                        <a:t>Market Cap:</a:t>
+                      </a:r>
+                    </a:p>
+                    <a:p>
+                      <a:pPr marL="0" marR="0" lvl="0" indent="0" algn="l" defTabSz="914395" rtl="0" eaLnBrk="1" fontAlgn="t" latinLnBrk="0" hangingPunct="1">
+                        <a:lnSpc>
+                          <a:spcPct val="100000"/>
+                        </a:lnSpc>
+                        <a:spcBef>
+                          <a:spcPts val="0"/>
+                        </a:spcBef>
+                        <a:spcAft>
+                          <a:spcPts val="0"/>
+                        </a:spcAft>
+                        <a:buClr>
+                          <a:srgbClr val="003B4C"/>
+                        </a:buClr>
+                        <a:buSzTx/>
+                        <a:buFont typeface="Wingdings" panose="05000000000000000000" pitchFamily="2" charset="2"/>
+                        <a:buNone/>
+                        <a:tabLst/>
+                        <a:defRPr/>
+                      </a:pPr>
+                      <a:r>
+                        <a:rPr kumimoji="0" lang="en-GB" sz="700" b="0" i="0" u="none" strike="noStrike" kern="1200" cap="none" spc="0" normalizeH="0" baseline="0" noProof="0" dirty="0">
+                          <a:ln>
+                            <a:noFill/>
+                          </a:ln>
+                          <a:solidFill>
+                            <a:srgbClr val="003B4C"/>
+                          </a:solidFill>
+                          <a:effectLst/>
+                          <a:uLnTx/>
+                          <a:uFillTx/>
+                          <a:latin typeface="Arial" panose="020B0604020202020204" pitchFamily="34" charset="0"/>
+                          <a:ea typeface="+mn-ea"/>
+                          <a:cs typeface="+mn-cs"/>
+                        </a:rPr>
+                        <a:t>Total Debt:</a:t>
+                      </a:r>
+                    </a:p>
+                    <a:p>
+                      <a:pPr marL="0" marR="0" lvl="0" indent="0" algn="l" defTabSz="914395" rtl="0" eaLnBrk="1" fontAlgn="t" latinLnBrk="0" hangingPunct="1">
+                        <a:lnSpc>
+                          <a:spcPct val="100000"/>
+                        </a:lnSpc>
+                        <a:spcBef>
+                          <a:spcPts val="0"/>
+                        </a:spcBef>
+                        <a:spcAft>
+                          <a:spcPts val="0"/>
+                        </a:spcAft>
+                        <a:buClr>
+                          <a:srgbClr val="003B4C"/>
+                        </a:buClr>
+                        <a:buSzTx/>
+                        <a:buFont typeface="Wingdings" panose="05000000000000000000" pitchFamily="2" charset="2"/>
+                        <a:buNone/>
+                        <a:tabLst/>
+                        <a:defRPr/>
+                      </a:pPr>
+                      <a:r>
+                        <a:rPr kumimoji="0" lang="en-GB" sz="700" b="0" i="0" u="none" strike="noStrike" kern="1200" cap="none" spc="0" normalizeH="0" baseline="0" noProof="0" dirty="0">
+                          <a:ln>
+                            <a:noFill/>
+                          </a:ln>
+                          <a:solidFill>
+                            <a:srgbClr val="003B4C"/>
+                          </a:solidFill>
+                          <a:effectLst/>
+                          <a:uLnTx/>
+                          <a:uFillTx/>
+                          <a:latin typeface="Arial" panose="020B0604020202020204" pitchFamily="34" charset="0"/>
+                          <a:ea typeface="+mn-ea"/>
+                          <a:cs typeface="+mn-cs"/>
+                        </a:rPr>
+                        <a:t>FTE:</a:t>
                       </a:r>
                     </a:p>
                   </a:txBody>
@@ -12562,7 +13027,159 @@
                           <a:ea typeface="+mn-ea"/>
                           <a:cs typeface="+mn-cs"/>
                         </a:rPr>
-                        <a:t>Revenue: EBITDA:  Market Cap: Total Debt:</a:t>
+                        <a:t>Revenue:</a:t>
+                      </a:r>
+                    </a:p>
+                    <a:p>
+                      <a:pPr marL="0" marR="0" lvl="0" indent="0" algn="l" defTabSz="914395" rtl="0" eaLnBrk="1" fontAlgn="t" latinLnBrk="0" hangingPunct="1">
+                        <a:lnSpc>
+                          <a:spcPct val="100000"/>
+                        </a:lnSpc>
+                        <a:spcBef>
+                          <a:spcPts val="0"/>
+                        </a:spcBef>
+                        <a:spcAft>
+                          <a:spcPts val="0"/>
+                        </a:spcAft>
+                        <a:buClr>
+                          <a:srgbClr val="003B4C"/>
+                        </a:buClr>
+                        <a:buSzTx/>
+                        <a:buFont typeface="Wingdings" panose="05000000000000000000" pitchFamily="2" charset="2"/>
+                        <a:buNone/>
+                        <a:tabLst/>
+                        <a:defRPr/>
+                      </a:pPr>
+                      <a:r>
+                        <a:rPr kumimoji="0" lang="en-GB" sz="700" b="0" i="0" u="none" strike="noStrike" kern="1200" cap="none" spc="0" normalizeH="0" baseline="0" noProof="0" dirty="0">
+                          <a:ln>
+                            <a:noFill/>
+                          </a:ln>
+                          <a:solidFill>
+                            <a:srgbClr val="003B4C"/>
+                          </a:solidFill>
+                          <a:effectLst/>
+                          <a:uLnTx/>
+                          <a:uFillTx/>
+                          <a:latin typeface="Arial" panose="020B0604020202020204" pitchFamily="34" charset="0"/>
+                          <a:ea typeface="+mn-ea"/>
+                          <a:cs typeface="+mn-cs"/>
+                        </a:rPr>
+                        <a:t>EBITDA:</a:t>
+                      </a:r>
+                    </a:p>
+                    <a:p>
+                      <a:pPr marL="0" marR="0" lvl="0" indent="0" algn="l" defTabSz="914395" rtl="0" eaLnBrk="1" fontAlgn="t" latinLnBrk="0" hangingPunct="1">
+                        <a:lnSpc>
+                          <a:spcPct val="100000"/>
+                        </a:lnSpc>
+                        <a:spcBef>
+                          <a:spcPts val="0"/>
+                        </a:spcBef>
+                        <a:spcAft>
+                          <a:spcPts val="0"/>
+                        </a:spcAft>
+                        <a:buClr>
+                          <a:srgbClr val="003B4C"/>
+                        </a:buClr>
+                        <a:buSzTx/>
+                        <a:buFont typeface="Wingdings" panose="05000000000000000000" pitchFamily="2" charset="2"/>
+                        <a:buNone/>
+                        <a:tabLst/>
+                        <a:defRPr/>
+                      </a:pPr>
+                      <a:r>
+                        <a:rPr kumimoji="0" lang="en-GB" sz="700" b="0" i="0" u="none" strike="noStrike" kern="1200" cap="none" spc="0" normalizeH="0" baseline="0" noProof="0" dirty="0">
+                          <a:ln>
+                            <a:noFill/>
+                          </a:ln>
+                          <a:solidFill>
+                            <a:srgbClr val="003B4C"/>
+                          </a:solidFill>
+                          <a:effectLst/>
+                          <a:uLnTx/>
+                          <a:uFillTx/>
+                          <a:latin typeface="Arial" panose="020B0604020202020204" pitchFamily="34" charset="0"/>
+                          <a:ea typeface="+mn-ea"/>
+                          <a:cs typeface="+mn-cs"/>
+                        </a:rPr>
+                        <a:t>Market Cap:</a:t>
+                      </a:r>
+                    </a:p>
+                    <a:p>
+                      <a:pPr marL="0" marR="0" lvl="0" indent="0" algn="l" defTabSz="914395" rtl="0" eaLnBrk="1" fontAlgn="t" latinLnBrk="0" hangingPunct="1">
+                        <a:lnSpc>
+                          <a:spcPct val="100000"/>
+                        </a:lnSpc>
+                        <a:spcBef>
+                          <a:spcPts val="0"/>
+                        </a:spcBef>
+                        <a:spcAft>
+                          <a:spcPts val="0"/>
+                        </a:spcAft>
+                        <a:buClr>
+                          <a:srgbClr val="003B4C"/>
+                        </a:buClr>
+                        <a:buSzTx/>
+                        <a:buFont typeface="Wingdings" panose="05000000000000000000" pitchFamily="2" charset="2"/>
+                        <a:buNone/>
+                        <a:tabLst/>
+                        <a:defRPr/>
+                      </a:pPr>
+                      <a:r>
+                        <a:rPr kumimoji="0" lang="en-GB" sz="700" b="0" i="0" u="none" strike="noStrike" kern="1200" cap="none" spc="0" normalizeH="0" baseline="0" noProof="0" dirty="0">
+                          <a:ln>
+                            <a:noFill/>
+                          </a:ln>
+                          <a:solidFill>
+                            <a:srgbClr val="003B4C"/>
+                          </a:solidFill>
+                          <a:effectLst/>
+                          <a:uLnTx/>
+                          <a:uFillTx/>
+                          <a:latin typeface="Arial" panose="020B0604020202020204" pitchFamily="34" charset="0"/>
+                          <a:ea typeface="+mn-ea"/>
+                          <a:cs typeface="+mn-cs"/>
+                        </a:rPr>
+                        <a:t>Total Debt:</a:t>
+                      </a:r>
+                    </a:p>
+                    <a:p>
+                      <a:pPr marL="0" marR="0" lvl="0" indent="0" algn="l" defTabSz="914395" rtl="0" eaLnBrk="1" fontAlgn="t" latinLnBrk="0" hangingPunct="1">
+                        <a:lnSpc>
+                          <a:spcPct val="100000"/>
+                        </a:lnSpc>
+                        <a:spcBef>
+                          <a:spcPts val="0"/>
+                        </a:spcBef>
+                        <a:spcAft>
+                          <a:spcPts val="0"/>
+                        </a:spcAft>
+                        <a:buClr>
+                          <a:srgbClr val="003B4C"/>
+                        </a:buClr>
+                        <a:buSzTx/>
+                        <a:buFont typeface="Wingdings" panose="05000000000000000000" pitchFamily="2" charset="2"/>
+                        <a:buNone/>
+                        <a:tabLst/>
+                        <a:defRPr/>
+                      </a:pPr>
+                      <a:r>
+                        <a:rPr kumimoji="0" lang="en-GB" sz="700" b="0" i="0" u="none" strike="noStrike" kern="1200" cap="none" spc="0" normalizeH="0" baseline="0" noProof="0" dirty="0">
+                          <a:ln>
+                            <a:noFill/>
+                          </a:ln>
+                          <a:solidFill>
+                            <a:srgbClr val="003B4C"/>
+                          </a:solidFill>
+                          <a:effectLst/>
+                          <a:uLnTx/>
+                          <a:uFillTx/>
+                          <a:latin typeface="Arial" panose="020B0604020202020204" pitchFamily="34" charset="0"/>
+                          <a:ea typeface="+mn-ea"/>
+                          <a:cs typeface="+mn-cs"/>
+                        </a:rPr>
+                        <a:t>FTE:</a:t>
                       </a:r>
                     </a:p>
                   </a:txBody>
@@ -13349,7 +13966,159 @@
                           <a:ea typeface="+mn-ea"/>
                           <a:cs typeface="+mn-cs"/>
                         </a:rPr>
-                        <a:t>Revenue: EBITDA:  Market Cap: Total Debt:</a:t>
+                        <a:t>Revenue:</a:t>
+                      </a:r>
+                    </a:p>
+                    <a:p>
+                      <a:pPr marL="0" marR="0" lvl="0" indent="0" algn="l" defTabSz="914395" rtl="0" eaLnBrk="1" fontAlgn="t" latinLnBrk="0" hangingPunct="1">
+                        <a:lnSpc>
+                          <a:spcPct val="100000"/>
+                        </a:lnSpc>
+                        <a:spcBef>
+                          <a:spcPts val="0"/>
+                        </a:spcBef>
+                        <a:spcAft>
+                          <a:spcPts val="0"/>
+                        </a:spcAft>
+                        <a:buClr>
+                          <a:srgbClr val="003B4C"/>
+                        </a:buClr>
+                        <a:buSzTx/>
+                        <a:buFont typeface="Wingdings" panose="05000000000000000000" pitchFamily="2" charset="2"/>
+                        <a:buNone/>
+                        <a:tabLst/>
+                        <a:defRPr/>
+                      </a:pPr>
+                      <a:r>
+                        <a:rPr kumimoji="0" lang="en-GB" sz="700" b="0" i="0" u="none" strike="noStrike" kern="1200" cap="none" spc="0" normalizeH="0" baseline="0" noProof="0" dirty="0">
+                          <a:ln>
+                            <a:noFill/>
+                          </a:ln>
+                          <a:solidFill>
+                            <a:srgbClr val="003B4C"/>
+                          </a:solidFill>
+                          <a:effectLst/>
+                          <a:uLnTx/>
+                          <a:uFillTx/>
+                          <a:latin typeface="Arial" panose="020B0604020202020204" pitchFamily="34" charset="0"/>
+                          <a:ea typeface="+mn-ea"/>
+                          <a:cs typeface="+mn-cs"/>
+                        </a:rPr>
+                        <a:t>EBITDA:</a:t>
+                      </a:r>
+                    </a:p>
+                    <a:p>
+                      <a:pPr marL="0" marR="0" lvl="0" indent="0" algn="l" defTabSz="914395" rtl="0" eaLnBrk="1" fontAlgn="t" latinLnBrk="0" hangingPunct="1">
+                        <a:lnSpc>
+                          <a:spcPct val="100000"/>
+                        </a:lnSpc>
+                        <a:spcBef>
+                          <a:spcPts val="0"/>
+                        </a:spcBef>
+                        <a:spcAft>
+                          <a:spcPts val="0"/>
+                        </a:spcAft>
+                        <a:buClr>
+                          <a:srgbClr val="003B4C"/>
+                        </a:buClr>
+                        <a:buSzTx/>
+                        <a:buFont typeface="Wingdings" panose="05000000000000000000" pitchFamily="2" charset="2"/>
+                        <a:buNone/>
+                        <a:tabLst/>
+                        <a:defRPr/>
+                      </a:pPr>
+                      <a:r>
+                        <a:rPr kumimoji="0" lang="en-GB" sz="700" b="0" i="0" u="none" strike="noStrike" kern="1200" cap="none" spc="0" normalizeH="0" baseline="0" noProof="0" dirty="0">
+                          <a:ln>
+                            <a:noFill/>
+                          </a:ln>
+                          <a:solidFill>
+                            <a:srgbClr val="003B4C"/>
+                          </a:solidFill>
+                          <a:effectLst/>
+                          <a:uLnTx/>
+                          <a:uFillTx/>
+                          <a:latin typeface="Arial" panose="020B0604020202020204" pitchFamily="34" charset="0"/>
+                          <a:ea typeface="+mn-ea"/>
+                          <a:cs typeface="+mn-cs"/>
+                        </a:rPr>
+                        <a:t>Market Cap:</a:t>
+                      </a:r>
+                    </a:p>
+                    <a:p>
+                      <a:pPr marL="0" marR="0" lvl="0" indent="0" algn="l" defTabSz="914395" rtl="0" eaLnBrk="1" fontAlgn="t" latinLnBrk="0" hangingPunct="1">
+                        <a:lnSpc>
+                          <a:spcPct val="100000"/>
+                        </a:lnSpc>
+                        <a:spcBef>
+                          <a:spcPts val="0"/>
+                        </a:spcBef>
+                        <a:spcAft>
+                          <a:spcPts val="0"/>
+                        </a:spcAft>
+                        <a:buClr>
+                          <a:srgbClr val="003B4C"/>
+                        </a:buClr>
+                        <a:buSzTx/>
+                        <a:buFont typeface="Wingdings" panose="05000000000000000000" pitchFamily="2" charset="2"/>
+                        <a:buNone/>
+                        <a:tabLst/>
+                        <a:defRPr/>
+                      </a:pPr>
+                      <a:r>
+                        <a:rPr kumimoji="0" lang="en-GB" sz="700" b="0" i="0" u="none" strike="noStrike" kern="1200" cap="none" spc="0" normalizeH="0" baseline="0" noProof="0" dirty="0">
+                          <a:ln>
+                            <a:noFill/>
+                          </a:ln>
+                          <a:solidFill>
+                            <a:srgbClr val="003B4C"/>
+                          </a:solidFill>
+                          <a:effectLst/>
+                          <a:uLnTx/>
+                          <a:uFillTx/>
+                          <a:latin typeface="Arial" panose="020B0604020202020204" pitchFamily="34" charset="0"/>
+                          <a:ea typeface="+mn-ea"/>
+                          <a:cs typeface="+mn-cs"/>
+                        </a:rPr>
+                        <a:t>Total Debt:</a:t>
+                      </a:r>
+                    </a:p>
+                    <a:p>
+                      <a:pPr marL="0" marR="0" lvl="0" indent="0" algn="l" defTabSz="914395" rtl="0" eaLnBrk="1" fontAlgn="t" latinLnBrk="0" hangingPunct="1">
+                        <a:lnSpc>
+                          <a:spcPct val="100000"/>
+                        </a:lnSpc>
+                        <a:spcBef>
+                          <a:spcPts val="0"/>
+                        </a:spcBef>
+                        <a:spcAft>
+                          <a:spcPts val="0"/>
+                        </a:spcAft>
+                        <a:buClr>
+                          <a:srgbClr val="003B4C"/>
+                        </a:buClr>
+                        <a:buSzTx/>
+                        <a:buFont typeface="Wingdings" panose="05000000000000000000" pitchFamily="2" charset="2"/>
+                        <a:buNone/>
+                        <a:tabLst/>
+                        <a:defRPr/>
+                      </a:pPr>
+                      <a:r>
+                        <a:rPr kumimoji="0" lang="en-GB" sz="700" b="0" i="0" u="none" strike="noStrike" kern="1200" cap="none" spc="0" normalizeH="0" baseline="0" noProof="0" dirty="0">
+                          <a:ln>
+                            <a:noFill/>
+                          </a:ln>
+                          <a:solidFill>
+                            <a:srgbClr val="003B4C"/>
+                          </a:solidFill>
+                          <a:effectLst/>
+                          <a:uLnTx/>
+                          <a:uFillTx/>
+                          <a:latin typeface="Arial" panose="020B0604020202020204" pitchFamily="34" charset="0"/>
+                          <a:ea typeface="+mn-ea"/>
+                          <a:cs typeface="+mn-cs"/>
+                        </a:rPr>
+                        <a:t>FTE:</a:t>
                       </a:r>
                     </a:p>
                   </a:txBody>
@@ -14124,7 +14893,159 @@
                           <a:ea typeface="+mn-ea"/>
                           <a:cs typeface="+mn-cs"/>
                         </a:rPr>
-                        <a:t>Revenue: EBITDA:  Market Cap: Total Debt:</a:t>
+                        <a:t>Revenue:</a:t>
+                      </a:r>
+                    </a:p>
+                    <a:p>
+                      <a:pPr marL="0" marR="0" lvl="0" indent="0" algn="l" defTabSz="914395" rtl="0" eaLnBrk="1" fontAlgn="t" latinLnBrk="0" hangingPunct="1">
+                        <a:lnSpc>
+                          <a:spcPct val="100000"/>
+                        </a:lnSpc>
+                        <a:spcBef>
+                          <a:spcPts val="0"/>
+                        </a:spcBef>
+                        <a:spcAft>
+                          <a:spcPts val="0"/>
+                        </a:spcAft>
+                        <a:buClr>
+                          <a:srgbClr val="003B4C"/>
+                        </a:buClr>
+                        <a:buSzTx/>
+                        <a:buFont typeface="Wingdings" panose="05000000000000000000" pitchFamily="2" charset="2"/>
+                        <a:buNone/>
+                        <a:tabLst/>
+                        <a:defRPr/>
+                      </a:pPr>
+                      <a:r>
+                        <a:rPr kumimoji="0" lang="en-GB" sz="700" b="0" i="0" u="none" strike="noStrike" kern="1200" cap="none" spc="0" normalizeH="0" baseline="0" noProof="0" dirty="0">
+                          <a:ln>
+                            <a:noFill/>
+                          </a:ln>
+                          <a:solidFill>
+                            <a:srgbClr val="003B4C"/>
+                          </a:solidFill>
+                          <a:effectLst/>
+                          <a:uLnTx/>
+                          <a:uFillTx/>
+                          <a:latin typeface="Arial" panose="020B0604020202020204" pitchFamily="34" charset="0"/>
+                          <a:ea typeface="+mn-ea"/>
+                          <a:cs typeface="+mn-cs"/>
+                        </a:rPr>
+                        <a:t>EBITDA:</a:t>
+                      </a:r>
+                    </a:p>
+                    <a:p>
+                      <a:pPr marL="0" marR="0" lvl="0" indent="0" algn="l" defTabSz="914395" rtl="0" eaLnBrk="1" fontAlgn="t" latinLnBrk="0" hangingPunct="1">
+                        <a:lnSpc>
+                          <a:spcPct val="100000"/>
+                        </a:lnSpc>
+                        <a:spcBef>
+                          <a:spcPts val="0"/>
+                        </a:spcBef>
+                        <a:spcAft>
+                          <a:spcPts val="0"/>
+                        </a:spcAft>
+                        <a:buClr>
+                          <a:srgbClr val="003B4C"/>
+                        </a:buClr>
+                        <a:buSzTx/>
+                        <a:buFont typeface="Wingdings" panose="05000000000000000000" pitchFamily="2" charset="2"/>
+                        <a:buNone/>
+                        <a:tabLst/>
+                        <a:defRPr/>
+                      </a:pPr>
+                      <a:r>
+                        <a:rPr kumimoji="0" lang="en-GB" sz="700" b="0" i="0" u="none" strike="noStrike" kern="1200" cap="none" spc="0" normalizeH="0" baseline="0" noProof="0" dirty="0">
+                          <a:ln>
+                            <a:noFill/>
+                          </a:ln>
+                          <a:solidFill>
+                            <a:srgbClr val="003B4C"/>
+                          </a:solidFill>
+                          <a:effectLst/>
+                          <a:uLnTx/>
+                          <a:uFillTx/>
+                          <a:latin typeface="Arial" panose="020B0604020202020204" pitchFamily="34" charset="0"/>
+                          <a:ea typeface="+mn-ea"/>
+                          <a:cs typeface="+mn-cs"/>
+                        </a:rPr>
+                        <a:t>Market Cap:</a:t>
+                      </a:r>
+                    </a:p>
+                    <a:p>
+                      <a:pPr marL="0" marR="0" lvl="0" indent="0" algn="l" defTabSz="914395" rtl="0" eaLnBrk="1" fontAlgn="t" latinLnBrk="0" hangingPunct="1">
+                        <a:lnSpc>
+                          <a:spcPct val="100000"/>
+                        </a:lnSpc>
+                        <a:spcBef>
+                          <a:spcPts val="0"/>
+                        </a:spcBef>
+                        <a:spcAft>
+                          <a:spcPts val="0"/>
+                        </a:spcAft>
+                        <a:buClr>
+                          <a:srgbClr val="003B4C"/>
+                        </a:buClr>
+                        <a:buSzTx/>
+                        <a:buFont typeface="Wingdings" panose="05000000000000000000" pitchFamily="2" charset="2"/>
+                        <a:buNone/>
+                        <a:tabLst/>
+                        <a:defRPr/>
+                      </a:pPr>
+                      <a:r>
+                        <a:rPr kumimoji="0" lang="en-GB" sz="700" b="0" i="0" u="none" strike="noStrike" kern="1200" cap="none" spc="0" normalizeH="0" baseline="0" noProof="0" dirty="0">
+                          <a:ln>
+                            <a:noFill/>
+                          </a:ln>
+                          <a:solidFill>
+                            <a:srgbClr val="003B4C"/>
+                          </a:solidFill>
+                          <a:effectLst/>
+                          <a:uLnTx/>
+                          <a:uFillTx/>
+                          <a:latin typeface="Arial" panose="020B0604020202020204" pitchFamily="34" charset="0"/>
+                          <a:ea typeface="+mn-ea"/>
+                          <a:cs typeface="+mn-cs"/>
+                        </a:rPr>
+                        <a:t>Total Debt:</a:t>
+                      </a:r>
+                    </a:p>
+                    <a:p>
+                      <a:pPr marL="0" marR="0" lvl="0" indent="0" algn="l" defTabSz="914395" rtl="0" eaLnBrk="1" fontAlgn="t" latinLnBrk="0" hangingPunct="1">
+                        <a:lnSpc>
+                          <a:spcPct val="100000"/>
+                        </a:lnSpc>
+                        <a:spcBef>
+                          <a:spcPts val="0"/>
+                        </a:spcBef>
+                        <a:spcAft>
+                          <a:spcPts val="0"/>
+                        </a:spcAft>
+                        <a:buClr>
+                          <a:srgbClr val="003B4C"/>
+                        </a:buClr>
+                        <a:buSzTx/>
+                        <a:buFont typeface="Wingdings" panose="05000000000000000000" pitchFamily="2" charset="2"/>
+                        <a:buNone/>
+                        <a:tabLst/>
+                        <a:defRPr/>
+                      </a:pPr>
+                      <a:r>
+                        <a:rPr kumimoji="0" lang="en-GB" sz="700" b="0" i="0" u="none" strike="noStrike" kern="1200" cap="none" spc="0" normalizeH="0" baseline="0" noProof="0" dirty="0">
+                          <a:ln>
+                            <a:noFill/>
+                          </a:ln>
+                          <a:solidFill>
+                            <a:srgbClr val="003B4C"/>
+                          </a:solidFill>
+                          <a:effectLst/>
+                          <a:uLnTx/>
+                          <a:uFillTx/>
+                          <a:latin typeface="Arial" panose="020B0604020202020204" pitchFamily="34" charset="0"/>
+                          <a:ea typeface="+mn-ea"/>
+                          <a:cs typeface="+mn-cs"/>
+                        </a:rPr>
+                        <a:t>FTE:</a:t>
                       </a:r>
                     </a:p>
                   </a:txBody>

</xml_diff>

<commit_message>
Adjusted dispatcher and app to new templates
</commit_message>
<xml_diff>
--- a/templates.pptx
+++ b/templates.pptx
@@ -865,8 +865,8 @@
         </p:nvSpPr>
         <p:spPr>
           <a:xfrm>
-            <a:off x="211016" y="6455020"/>
-            <a:ext cx="3233058" cy="228981"/>
+            <a:off x="220160" y="6458408"/>
+            <a:ext cx="3233058" cy="277068"/>
           </a:xfrm>
           <a:prstGeom prst="rect">
             <a:avLst/>
@@ -895,16 +895,160 @@
             </a:lvl1pPr>
           </a:lstStyle>
           <a:p>
+            <a:pPr marL="0" marR="0" lvl="0" indent="0" algn="l" defTabSz="914395" rtl="0" eaLnBrk="1" fontAlgn="t" latinLnBrk="0" hangingPunct="1">
+              <a:lnSpc>
+                <a:spcPct val="100000"/>
+              </a:lnSpc>
+              <a:spcBef>
+                <a:spcPts val="0"/>
+              </a:spcBef>
+              <a:spcAft>
+                <a:spcPts val="0"/>
+              </a:spcAft>
+              <a:buClrTx/>
+              <a:buSzTx/>
+              <a:buFontTx/>
+              <a:buNone/>
+              <a:tabLst/>
+              <a:defRPr/>
+            </a:pPr>
             <a:r>
-              <a:rPr lang="pt-BR" sz="525" noProof="0" dirty="0"/>
-              <a:t>Fonte: CapIQ , Pitchbook, Informações Públicas – A informação financeira corresponde aos dados mais recentes disponíveis na plataforma e nos sites das empresas</a:t>
+              <a:rPr lang="en-US" sz="530" b="0" i="1" u="none" strike="noStrike" kern="1200" dirty="0">
+                <a:solidFill>
+                  <a:schemeClr val="bg1">
+                    <a:lumMod val="65000"/>
+                  </a:schemeClr>
+                </a:solidFill>
+                <a:effectLst/>
+                <a:latin typeface="+mn-lt"/>
+                <a:ea typeface="+mn-ea"/>
+                <a:cs typeface="+mn-cs"/>
+              </a:rPr>
+              <a:t>Source</a:t>
             </a:r>
-          </a:p>
-          <a:p>
             <a:r>
-              <a:rPr lang="pt-BR" sz="525" noProof="0" dirty="0"/>
-              <a:t>Nota: 1. Últimos XX anos</a:t>
+              <a:rPr lang="en-US" sz="530" b="1" i="1" u="none" strike="noStrike" kern="1200" dirty="0">
+                <a:solidFill>
+                  <a:schemeClr val="bg1">
+                    <a:lumMod val="65000"/>
+                  </a:schemeClr>
+                </a:solidFill>
+                <a:effectLst/>
+                <a:latin typeface="+mn-lt"/>
+                <a:ea typeface="+mn-ea"/>
+                <a:cs typeface="+mn-cs"/>
+              </a:rPr>
+              <a:t>:</a:t>
             </a:r>
+            <a:r>
+              <a:rPr lang="en-US" sz="530" b="0" i="1" u="none" strike="noStrike" kern="1200" dirty="0">
+                <a:solidFill>
+                  <a:schemeClr val="bg1">
+                    <a:lumMod val="65000"/>
+                  </a:schemeClr>
+                </a:solidFill>
+                <a:effectLst/>
+                <a:latin typeface="+mn-lt"/>
+                <a:ea typeface="+mn-ea"/>
+                <a:cs typeface="+mn-cs"/>
+              </a:rPr>
+              <a:t> CapIQ, </a:t>
+            </a:r>
+            <a:r>
+              <a:rPr lang="en-US" sz="530" b="0" i="1" u="none" strike="noStrike" kern="1200" dirty="0" err="1">
+                <a:solidFill>
+                  <a:schemeClr val="bg1">
+                    <a:lumMod val="65000"/>
+                  </a:schemeClr>
+                </a:solidFill>
+                <a:effectLst/>
+                <a:latin typeface="+mn-lt"/>
+                <a:ea typeface="+mn-ea"/>
+                <a:cs typeface="+mn-cs"/>
+              </a:rPr>
+              <a:t>PitchBook</a:t>
+            </a:r>
+            <a:r>
+              <a:rPr lang="en-US" sz="530" b="0" i="1" u="none" strike="noStrike" kern="1200" dirty="0">
+                <a:solidFill>
+                  <a:schemeClr val="bg1">
+                    <a:lumMod val="65000"/>
+                  </a:schemeClr>
+                </a:solidFill>
+                <a:effectLst/>
+                <a:latin typeface="+mn-lt"/>
+                <a:ea typeface="+mn-ea"/>
+                <a:cs typeface="+mn-cs"/>
+              </a:rPr>
+              <a:t>, Public Information – The financial information corresponds to the most recent data available on the platform and company websites</a:t>
+            </a:r>
+            <a:br>
+              <a:rPr lang="en-US" sz="530" i="1" dirty="0">
+                <a:solidFill>
+                  <a:schemeClr val="bg1">
+                    <a:lumMod val="65000"/>
+                  </a:schemeClr>
+                </a:solidFill>
+              </a:rPr>
+            </a:br>
+            <a:r>
+              <a:rPr lang="en-US" sz="530" b="0" i="1" u="none" strike="noStrike" kern="1200" dirty="0">
+                <a:solidFill>
+                  <a:schemeClr val="bg1">
+                    <a:lumMod val="65000"/>
+                  </a:schemeClr>
+                </a:solidFill>
+                <a:effectLst/>
+                <a:latin typeface="+mn-lt"/>
+                <a:ea typeface="+mn-ea"/>
+                <a:cs typeface="+mn-cs"/>
+              </a:rPr>
+              <a:t>Note</a:t>
+            </a:r>
+            <a:r>
+              <a:rPr lang="en-US" sz="530" b="1" i="1" u="none" strike="noStrike" kern="1200" dirty="0">
+                <a:solidFill>
+                  <a:schemeClr val="bg1">
+                    <a:lumMod val="65000"/>
+                  </a:schemeClr>
+                </a:solidFill>
+                <a:effectLst/>
+                <a:latin typeface="+mn-lt"/>
+                <a:ea typeface="+mn-ea"/>
+                <a:cs typeface="+mn-cs"/>
+              </a:rPr>
+              <a:t>:</a:t>
+            </a:r>
+            <a:r>
+              <a:rPr lang="en-US" sz="530" b="0" i="1" u="none" strike="noStrike" kern="1200" dirty="0">
+                <a:solidFill>
+                  <a:schemeClr val="bg1">
+                    <a:lumMod val="65000"/>
+                  </a:schemeClr>
+                </a:solidFill>
+                <a:effectLst/>
+                <a:latin typeface="+mn-lt"/>
+                <a:ea typeface="+mn-ea"/>
+                <a:cs typeface="+mn-cs"/>
+              </a:rPr>
+              <a:t> 1. Last XX years</a:t>
+            </a:r>
+            <a:endParaRPr kumimoji="0" lang="pt-BR" sz="530" b="0" i="1" u="none" strike="noStrike" kern="1200" cap="none" spc="0" normalizeH="0" baseline="0" noProof="0" dirty="0">
+              <a:ln>
+                <a:noFill/>
+              </a:ln>
+              <a:solidFill>
+                <a:schemeClr val="bg1">
+                  <a:lumMod val="65000"/>
+                </a:schemeClr>
+              </a:solidFill>
+              <a:effectLst/>
+              <a:uLnTx/>
+              <a:uFillTx/>
+              <a:latin typeface="+mn-lt"/>
+              <a:ea typeface="+mn-ea"/>
+              <a:cs typeface="+mn-cs"/>
+            </a:endParaRPr>
           </a:p>
         </p:txBody>
       </p:sp>
@@ -923,7 +1067,7 @@
 
 <file path=ppt/slideLayouts/slideLayout3.xml><?xml version="1.0" encoding="utf-8"?>
 <p:sldLayout xmlns:a="http://schemas.openxmlformats.org/drawingml/2006/main" xmlns:r="http://schemas.openxmlformats.org/officeDocument/2006/relationships" xmlns:p="http://schemas.openxmlformats.org/presentationml/2006/main" preserve="1" userDrawn="1">
-  <p:cSld name="1_Potential Buyers Strip BR EN">
+  <p:cSld name="Potential Buyers Strip BR PT">
     <p:spTree>
       <p:nvGrpSpPr>
         <p:cNvPr id="1" name=""/>
@@ -1202,14 +1346,36 @@
             </a:lvl1pPr>
           </a:lstStyle>
           <a:p>
+            <a:pPr>
+              <a:lnSpc>
+                <a:spcPct val="100000"/>
+              </a:lnSpc>
+            </a:pPr>
             <a:r>
-              <a:rPr lang="pt-BR" sz="525" noProof="0" dirty="0"/>
+              <a:rPr lang="pt-BR" sz="525" noProof="0" dirty="0">
+                <a:solidFill>
+                  <a:schemeClr val="bg1">
+                    <a:lumMod val="65000"/>
+                  </a:schemeClr>
+                </a:solidFill>
+              </a:rPr>
               <a:t>Fonte: CapIQ , Pitchbook, Informações Públicas – A informação financeira corresponde aos dados mais recentes disponíveis na plataforma e nos sites das empresas</a:t>
             </a:r>
           </a:p>
           <a:p>
+            <a:pPr>
+              <a:lnSpc>
+                <a:spcPct val="100000"/>
+              </a:lnSpc>
+            </a:pPr>
             <a:r>
-              <a:rPr lang="pt-BR" sz="525" noProof="0" dirty="0"/>
+              <a:rPr lang="pt-BR" sz="525" noProof="0" dirty="0">
+                <a:solidFill>
+                  <a:schemeClr val="bg1">
+                    <a:lumMod val="65000"/>
+                  </a:schemeClr>
+                </a:solidFill>
+              </a:rPr>
               <a:t>Nota: 1. Últimos XX anos</a:t>
             </a:r>
           </a:p>
@@ -15775,10 +15941,10 @@
       </p:grpSpPr>
       <p:sp>
         <p:nvSpPr>
-          <p:cNvPr id="2" name="Title 1">
+          <p:cNvPr id="4" name="Title 3">
             <a:extLst>
               <a:ext uri="{FF2B5EF4-FFF2-40B4-BE49-F238E27FC236}">
-                <a16:creationId xmlns:a16="http://schemas.microsoft.com/office/drawing/2014/main" id="{4330465B-9D4B-9F91-3975-AFCE46E5D42E}"/>
+                <a16:creationId xmlns:a16="http://schemas.microsoft.com/office/drawing/2014/main" id="{8C3AD842-5C46-6F60-DF06-18DED07AFE5D}"/>
               </a:ext>
             </a:extLst>
           </p:cNvPr>
@@ -15794,7 +15960,7 @@
           <a:bodyPr/>
           <a:lstStyle/>
           <a:p>
-            <a:endParaRPr lang="en-US" noProof="0" dirty="0"/>
+            <a:endParaRPr lang="en-US"/>
           </a:p>
         </p:txBody>
       </p:sp>
@@ -20544,10 +20710,10 @@
       </p:grpSpPr>
       <p:sp>
         <p:nvSpPr>
-          <p:cNvPr id="2" name="Title 1">
+          <p:cNvPr id="5" name="Title 4">
             <a:extLst>
               <a:ext uri="{FF2B5EF4-FFF2-40B4-BE49-F238E27FC236}">
-                <a16:creationId xmlns:a16="http://schemas.microsoft.com/office/drawing/2014/main" id="{0F81CECD-EB33-65CB-F900-BDC862E70DF8}"/>
+                <a16:creationId xmlns:a16="http://schemas.microsoft.com/office/drawing/2014/main" id="{ED9D6370-CC4C-660D-097E-BE9B4FA869E7}"/>
               </a:ext>
             </a:extLst>
           </p:cNvPr>
@@ -20563,7 +20729,7 @@
           <a:bodyPr/>
           <a:lstStyle/>
           <a:p>
-            <a:endParaRPr lang="pt-BR" noProof="0" dirty="0"/>
+            <a:endParaRPr lang="en-US"/>
           </a:p>
         </p:txBody>
       </p:sp>

</xml_diff>